<commit_message>
added Hands On Demos
</commit_message>
<xml_diff>
--- a/4. UI/Day 32/Slides/2. Introduction/introduction-slides.pptx
+++ b/4. UI/Day 32/Slides/2. Introduction/introduction-slides.pptx
@@ -5,33 +5,33 @@
     <p:sldMasterId id="2147483648" r:id="rId1"/>
   </p:sldMasterIdLst>
   <p:notesMasterIdLst>
-    <p:notesMasterId r:id="rId27"/>
+    <p:notesMasterId r:id="rId26"/>
   </p:notesMasterIdLst>
   <p:sldIdLst>
-    <p:sldId id="256" r:id="rId3"/>
-    <p:sldId id="257" r:id="rId4"/>
-    <p:sldId id="258" r:id="rId5"/>
-    <p:sldId id="259" r:id="rId6"/>
-    <p:sldId id="260" r:id="rId7"/>
-    <p:sldId id="261" r:id="rId8"/>
-    <p:sldId id="262" r:id="rId9"/>
-    <p:sldId id="263" r:id="rId10"/>
-    <p:sldId id="266" r:id="rId11"/>
-    <p:sldId id="267" r:id="rId12"/>
-    <p:sldId id="268" r:id="rId13"/>
-    <p:sldId id="272" r:id="rId14"/>
-    <p:sldId id="273" r:id="rId15"/>
-    <p:sldId id="274" r:id="rId16"/>
-    <p:sldId id="275" r:id="rId17"/>
-    <p:sldId id="276" r:id="rId18"/>
-    <p:sldId id="278" r:id="rId19"/>
-    <p:sldId id="277" r:id="rId20"/>
-    <p:sldId id="269" r:id="rId21"/>
-    <p:sldId id="270" r:id="rId22"/>
-    <p:sldId id="284" r:id="rId23"/>
-    <p:sldId id="285" r:id="rId24"/>
-    <p:sldId id="286" r:id="rId25"/>
-    <p:sldId id="271" r:id="rId26"/>
+    <p:sldId id="256" r:id="rId2"/>
+    <p:sldId id="257" r:id="rId3"/>
+    <p:sldId id="258" r:id="rId4"/>
+    <p:sldId id="259" r:id="rId5"/>
+    <p:sldId id="260" r:id="rId6"/>
+    <p:sldId id="261" r:id="rId7"/>
+    <p:sldId id="262" r:id="rId8"/>
+    <p:sldId id="263" r:id="rId9"/>
+    <p:sldId id="266" r:id="rId10"/>
+    <p:sldId id="267" r:id="rId11"/>
+    <p:sldId id="268" r:id="rId12"/>
+    <p:sldId id="272" r:id="rId13"/>
+    <p:sldId id="273" r:id="rId14"/>
+    <p:sldId id="274" r:id="rId15"/>
+    <p:sldId id="275" r:id="rId16"/>
+    <p:sldId id="276" r:id="rId17"/>
+    <p:sldId id="278" r:id="rId18"/>
+    <p:sldId id="277" r:id="rId19"/>
+    <p:sldId id="269" r:id="rId20"/>
+    <p:sldId id="270" r:id="rId21"/>
+    <p:sldId id="284" r:id="rId22"/>
+    <p:sldId id="285" r:id="rId23"/>
+    <p:sldId id="286" r:id="rId24"/>
+    <p:sldId id="271" r:id="rId25"/>
   </p:sldIdLst>
   <p:sldSz cx="18288000" cy="10287000"/>
   <p:notesSz cx="18288000" cy="10287000"/>
@@ -127,6 +127,22 @@
       </a:defRPr>
     </a:lvl9pPr>
   </p:defaultTextStyle>
+  <p:extLst>
+    <p:ext uri="{EFAFB233-063F-42B5-8137-9DF3F51BA10A}">
+      <p15:sldGuideLst xmlns:p15="http://schemas.microsoft.com/office/powerpoint/2012/main">
+        <p15:guide id="1" orient="horz" pos="2880">
+          <p15:clr>
+            <a:srgbClr val="A4A3A4"/>
+          </p15:clr>
+        </p15:guide>
+        <p15:guide id="2" pos="2160">
+          <p15:clr>
+            <a:srgbClr val="A4A3A4"/>
+          </p15:clr>
+        </p15:guide>
+      </p15:sldGuideLst>
+    </p:ext>
+  </p:extLst>
 </p:presentation>
 </file>
 
@@ -212,6 +228,7 @@
           <a:p>
             <a:fld id="{3EFD42F7-718C-4B98-AAEC-167E6DDD60A7}" type="datetimeFigureOut">
               <a:rPr lang="en-US" smtClean="0"/>
+              <a:t>5/4/2023</a:t>
             </a:fld>
             <a:endParaRPr lang="en-US"/>
           </a:p>
@@ -275,42 +292,37 @@
           <a:p>
             <a:pPr lvl="0"/>
             <a:r>
-              <a:rPr lang="en-US" smtClean="0"/>
+              <a:rPr lang="en-US"/>
               <a:t>Click to edit Master text styles</a:t>
             </a:r>
-            <a:endParaRPr lang="en-US" smtClean="0"/>
           </a:p>
           <a:p>
             <a:pPr lvl="1"/>
             <a:r>
-              <a:rPr lang="en-US" smtClean="0"/>
+              <a:rPr lang="en-US"/>
               <a:t>Second level</a:t>
             </a:r>
-            <a:endParaRPr lang="en-US" smtClean="0"/>
           </a:p>
           <a:p>
             <a:pPr lvl="2"/>
             <a:r>
-              <a:rPr lang="en-US" smtClean="0"/>
+              <a:rPr lang="en-US"/>
               <a:t>Third level</a:t>
             </a:r>
-            <a:endParaRPr lang="en-US" smtClean="0"/>
           </a:p>
           <a:p>
             <a:pPr lvl="3"/>
             <a:r>
-              <a:rPr lang="en-US" smtClean="0"/>
+              <a:rPr lang="en-US"/>
               <a:t>Fourth level</a:t>
             </a:r>
-            <a:endParaRPr lang="en-US" smtClean="0"/>
           </a:p>
           <a:p>
             <a:pPr lvl="4"/>
             <a:r>
-              <a:rPr lang="en-US" smtClean="0"/>
+              <a:rPr lang="en-US"/>
               <a:t>Fifth level</a:t>
             </a:r>
-            <a:endParaRPr lang="en-US"/>
           </a:p>
         </p:txBody>
       </p:sp>
@@ -374,6 +386,7 @@
           <a:p>
             <a:fld id="{21B2AA4F-B828-4D7C-AFD3-893933DAFCB4}" type="slidenum">
               <a:rPr lang="en-US" smtClean="0"/>
+              <a:t>‹#›</a:t>
             </a:fld>
             <a:endParaRPr lang="en-US"/>
           </a:p>
@@ -526,7 +539,9 @@
               </a:defRPr>
             </a:lvl1pPr>
           </a:lstStyle>
-          <a:p/>
+          <a:p>
+            <a:endParaRPr/>
+          </a:p>
         </p:txBody>
       </p:sp>
       <p:sp>
@@ -557,7 +572,9 @@
               <a:defRPr/>
             </a:lvl1pPr>
           </a:lstStyle>
-          <a:p/>
+          <a:p>
+            <a:endParaRPr/>
+          </a:p>
         </p:txBody>
       </p:sp>
       <p:sp>
@@ -584,7 +601,9 @@
               </a:defRPr>
             </a:lvl1pPr>
           </a:lstStyle>
-          <a:p/>
+          <a:p>
+            <a:endParaRPr/>
+          </a:p>
         </p:txBody>
       </p:sp>
       <p:sp>
@@ -614,6 +633,7 @@
           <a:p>
             <a:fld id="{1D8BD707-D9CF-40AE-B4C6-C98DA3205C09}" type="datetimeFigureOut">
               <a:rPr lang="en-US"/>
+              <a:t>5/4/2023</a:t>
             </a:fld>
             <a:endParaRPr lang="en-US"/>
           </a:p>
@@ -646,6 +666,7 @@
           <a:p>
             <a:fld id="{B6F15528-21DE-4FAA-801E-634DDDAF4B2B}" type="slidenum">
               <a:rPr/>
+              <a:t>‹#›</a:t>
             </a:fld>
             <a:endParaRPr/>
           </a:p>
@@ -701,7 +722,9 @@
               </a:defRPr>
             </a:lvl1pPr>
           </a:lstStyle>
-          <a:p/>
+          <a:p>
+            <a:endParaRPr/>
+          </a:p>
         </p:txBody>
       </p:sp>
       <p:sp>
@@ -728,7 +751,9 @@
               </a:defRPr>
             </a:lvl1pPr>
           </a:lstStyle>
-          <a:p/>
+          <a:p>
+            <a:endParaRPr/>
+          </a:p>
         </p:txBody>
       </p:sp>
       <p:sp>
@@ -755,7 +780,9 @@
               </a:defRPr>
             </a:lvl1pPr>
           </a:lstStyle>
-          <a:p/>
+          <a:p>
+            <a:endParaRPr/>
+          </a:p>
         </p:txBody>
       </p:sp>
       <p:sp>
@@ -785,6 +812,7 @@
           <a:p>
             <a:fld id="{1D8BD707-D9CF-40AE-B4C6-C98DA3205C09}" type="datetimeFigureOut">
               <a:rPr lang="en-US"/>
+              <a:t>5/4/2023</a:t>
             </a:fld>
             <a:endParaRPr lang="en-US"/>
           </a:p>
@@ -817,6 +845,7 @@
           <a:p>
             <a:fld id="{B6F15528-21DE-4FAA-801E-634DDDAF4B2B}" type="slidenum">
               <a:rPr/>
+              <a:t>‹#›</a:t>
             </a:fld>
             <a:endParaRPr/>
           </a:p>
@@ -872,7 +901,9 @@
               </a:defRPr>
             </a:lvl1pPr>
           </a:lstStyle>
-          <a:p/>
+          <a:p>
+            <a:endParaRPr/>
+          </a:p>
         </p:txBody>
       </p:sp>
       <p:sp>
@@ -903,7 +934,9 @@
               <a:defRPr/>
             </a:lvl1pPr>
           </a:lstStyle>
-          <a:p/>
+          <a:p>
+            <a:endParaRPr/>
+          </a:p>
         </p:txBody>
       </p:sp>
       <p:sp>
@@ -934,7 +967,9 @@
               <a:defRPr/>
             </a:lvl1pPr>
           </a:lstStyle>
-          <a:p/>
+          <a:p>
+            <a:endParaRPr/>
+          </a:p>
         </p:txBody>
       </p:sp>
       <p:sp>
@@ -961,7 +996,9 @@
               </a:defRPr>
             </a:lvl1pPr>
           </a:lstStyle>
-          <a:p/>
+          <a:p>
+            <a:endParaRPr/>
+          </a:p>
         </p:txBody>
       </p:sp>
       <p:sp>
@@ -991,6 +1028,7 @@
           <a:p>
             <a:fld id="{1D8BD707-D9CF-40AE-B4C6-C98DA3205C09}" type="datetimeFigureOut">
               <a:rPr lang="en-US"/>
+              <a:t>5/4/2023</a:t>
             </a:fld>
             <a:endParaRPr lang="en-US"/>
           </a:p>
@@ -1023,6 +1061,7 @@
           <a:p>
             <a:fld id="{B6F15528-21DE-4FAA-801E-634DDDAF4B2B}" type="slidenum">
               <a:rPr/>
+              <a:t>‹#›</a:t>
             </a:fld>
             <a:endParaRPr/>
           </a:p>
@@ -1078,7 +1117,9 @@
               </a:defRPr>
             </a:lvl1pPr>
           </a:lstStyle>
-          <a:p/>
+          <a:p>
+            <a:endParaRPr/>
+          </a:p>
         </p:txBody>
       </p:sp>
       <p:sp>
@@ -1105,7 +1146,9 @@
               </a:defRPr>
             </a:lvl1pPr>
           </a:lstStyle>
-          <a:p/>
+          <a:p>
+            <a:endParaRPr/>
+          </a:p>
         </p:txBody>
       </p:sp>
       <p:sp>
@@ -1135,6 +1178,7 @@
           <a:p>
             <a:fld id="{1D8BD707-D9CF-40AE-B4C6-C98DA3205C09}" type="datetimeFigureOut">
               <a:rPr lang="en-US"/>
+              <a:t>5/4/2023</a:t>
             </a:fld>
             <a:endParaRPr lang="en-US"/>
           </a:p>
@@ -1167,6 +1211,7 @@
           <a:p>
             <a:fld id="{B6F15528-21DE-4FAA-801E-634DDDAF4B2B}" type="slidenum">
               <a:rPr/>
+              <a:t>‹#›</a:t>
             </a:fld>
             <a:endParaRPr/>
           </a:p>
@@ -1222,7 +1267,9 @@
               </a:defRPr>
             </a:lvl1pPr>
           </a:lstStyle>
-          <a:p/>
+          <a:p>
+            <a:endParaRPr/>
+          </a:p>
         </p:txBody>
       </p:sp>
       <p:sp>
@@ -1252,6 +1299,7 @@
           <a:p>
             <a:fld id="{1D8BD707-D9CF-40AE-B4C6-C98DA3205C09}" type="datetimeFigureOut">
               <a:rPr lang="en-US"/>
+              <a:t>5/4/2023</a:t>
             </a:fld>
             <a:endParaRPr lang="en-US"/>
           </a:p>
@@ -1284,6 +1332,7 @@
           <a:p>
             <a:fld id="{B6F15528-21DE-4FAA-801E-634DDDAF4B2B}" type="slidenum">
               <a:rPr/>
+              <a:t>‹#›</a:t>
             </a:fld>
             <a:endParaRPr/>
           </a:p>
@@ -1331,10 +1380,9 @@
           <a:lstStyle/>
           <a:p>
             <a:r>
-              <a:rPr lang="en-US" smtClean="0"/>
+              <a:rPr lang="en-US"/>
               <a:t>Click to edit Master title style</a:t>
             </a:r>
-            <a:endParaRPr lang="en-US"/>
           </a:p>
         </p:txBody>
       </p:sp>
@@ -1355,42 +1403,37 @@
           <a:p>
             <a:pPr lvl="0"/>
             <a:r>
-              <a:rPr lang="en-US" smtClean="0"/>
+              <a:rPr lang="en-US"/>
               <a:t>Click to edit Master text styles</a:t>
             </a:r>
-            <a:endParaRPr lang="en-US" smtClean="0"/>
           </a:p>
           <a:p>
             <a:pPr lvl="1"/>
             <a:r>
-              <a:rPr lang="en-US" smtClean="0"/>
+              <a:rPr lang="en-US"/>
               <a:t>Second level</a:t>
             </a:r>
-            <a:endParaRPr lang="en-US" smtClean="0"/>
           </a:p>
           <a:p>
             <a:pPr lvl="2"/>
             <a:r>
-              <a:rPr lang="en-US" smtClean="0"/>
+              <a:rPr lang="en-US"/>
               <a:t>Third level</a:t>
             </a:r>
-            <a:endParaRPr lang="en-US" smtClean="0"/>
           </a:p>
           <a:p>
             <a:pPr lvl="3"/>
             <a:r>
-              <a:rPr lang="en-US" smtClean="0"/>
+              <a:rPr lang="en-US"/>
               <a:t>Fourth level</a:t>
             </a:r>
-            <a:endParaRPr lang="en-US" smtClean="0"/>
           </a:p>
           <a:p>
             <a:pPr lvl="4"/>
             <a:r>
-              <a:rPr lang="en-US" smtClean="0"/>
+              <a:rPr lang="en-US"/>
               <a:t>Fifth level</a:t>
             </a:r>
-            <a:endParaRPr lang="en-US"/>
           </a:p>
         </p:txBody>
       </p:sp>
@@ -1411,6 +1454,7 @@
           <a:p>
             <a:fld id="{1D8BD707-D9CF-40AE-B4C6-C98DA3205C09}" type="datetimeFigureOut">
               <a:rPr lang="en-US"/>
+              <a:t>5/4/2023</a:t>
             </a:fld>
             <a:endParaRPr lang="en-US"/>
           </a:p>
@@ -1430,7 +1474,9 @@
         <p:txBody>
           <a:bodyPr/>
           <a:lstStyle/>
-          <a:p/>
+          <a:p>
+            <a:endParaRPr/>
+          </a:p>
         </p:txBody>
       </p:sp>
       <p:sp>
@@ -1450,6 +1496,7 @@
           <a:p>
             <a:fld id="{B6F15528-21DE-4FAA-801E-634DDDAF4B2B}" type="slidenum">
               <a:rPr/>
+              <a:t>‹#›</a:t>
             </a:fld>
             <a:endParaRPr/>
           </a:p>
@@ -1522,7 +1569,9 @@
               </a:defRPr>
             </a:lvl1pPr>
           </a:lstStyle>
-          <a:p/>
+          <a:p>
+            <a:endParaRPr/>
+          </a:p>
         </p:txBody>
       </p:sp>
       <p:sp>
@@ -1559,7 +1608,9 @@
               </a:defRPr>
             </a:lvl1pPr>
           </a:lstStyle>
-          <a:p/>
+          <a:p>
+            <a:endParaRPr/>
+          </a:p>
         </p:txBody>
       </p:sp>
       <p:sp>
@@ -1596,7 +1647,9 @@
               </a:defRPr>
             </a:lvl1pPr>
           </a:lstStyle>
-          <a:p/>
+          <a:p>
+            <a:endParaRPr/>
+          </a:p>
         </p:txBody>
       </p:sp>
       <p:sp>
@@ -1636,6 +1689,7 @@
           <a:p>
             <a:fld id="{1D8BD707-D9CF-40AE-B4C6-C98DA3205C09}" type="datetimeFigureOut">
               <a:rPr lang="en-US"/>
+              <a:t>5/4/2023</a:t>
             </a:fld>
             <a:endParaRPr lang="en-US"/>
           </a:p>
@@ -1678,6 +1732,7 @@
           <a:p>
             <a:fld id="{B6F15528-21DE-4FAA-801E-634DDDAF4B2B}" type="slidenum">
               <a:rPr/>
+              <a:t>‹#›</a:t>
             </a:fld>
             <a:endParaRPr/>
           </a:p>
@@ -1863,7 +1918,7 @@
           <p:nvPr/>
         </p:nvPicPr>
         <p:blipFill>
-          <a:blip r:embed="rId1" cstate="print"/>
+          <a:blip r:embed="rId2" cstate="print"/>
           <a:stretch>
             <a:fillRect/>
           </a:stretch>
@@ -2027,9 +2082,11 @@
         <p:spPr/>
         <p:txBody>
           <a:bodyPr/>
+          <a:lstStyle/>
           <a:p>
             <a:fld id="{B6F15528-21DE-4FAA-801E-634DDDAF4B2B}" type="slidenum">
               <a:rPr/>
+              <a:t>1</a:t>
             </a:fld>
             <a:endParaRPr/>
           </a:p>
@@ -2097,7 +2154,9 @@
         <p:txBody>
           <a:bodyPr wrap="square" lIns="0" tIns="0" rIns="0" bIns="0" rtlCol="0"/>
           <a:lstStyle/>
-          <a:p/>
+          <a:p>
+            <a:endParaRPr/>
+          </a:p>
         </p:txBody>
       </p:sp>
       <p:sp>
@@ -2647,14 +2706,14 @@
           <p:nvPr/>
         </p:nvPicPr>
         <p:blipFill>
-          <a:blip r:embed="rId1" cstate="print"/>
+          <a:blip r:embed="rId2" cstate="print"/>
           <a:stretch>
             <a:fillRect/>
           </a:stretch>
         </p:blipFill>
         <p:spPr>
           <a:xfrm>
-            <a:off x="1257300" y="2897292"/>
+            <a:off x="1295400" y="2857500"/>
             <a:ext cx="5245100" cy="4957550"/>
           </a:xfrm>
           <a:prstGeom prst="rect">
@@ -2675,9 +2734,11 @@
         <p:spPr/>
         <p:txBody>
           <a:bodyPr/>
+          <a:lstStyle/>
           <a:p>
             <a:fld id="{B6F15528-21DE-4FAA-801E-634DDDAF4B2B}" type="slidenum">
               <a:rPr/>
+              <a:t>10</a:t>
             </a:fld>
             <a:endParaRPr/>
           </a:p>
@@ -2715,7 +2776,7 @@
           <p:nvPr/>
         </p:nvPicPr>
         <p:blipFill>
-          <a:blip r:embed="rId1" cstate="print"/>
+          <a:blip r:embed="rId2" cstate="print"/>
           <a:stretch>
             <a:fillRect/>
           </a:stretch>
@@ -2885,9 +2946,11 @@
         <p:spPr/>
         <p:txBody>
           <a:bodyPr/>
+          <a:lstStyle/>
           <a:p>
             <a:fld id="{B6F15528-21DE-4FAA-801E-634DDDAF4B2B}" type="slidenum">
               <a:rPr/>
+              <a:t>11</a:t>
             </a:fld>
             <a:endParaRPr/>
           </a:p>
@@ -2910,7 +2973,14 @@
         <p:cNvGrpSpPr/>
         <p:nvPr/>
       </p:nvGrpSpPr>
-      <p:grpSpPr/>
+      <p:grpSpPr>
+        <a:xfrm>
+          <a:off x="0" y="0"/>
+          <a:ext cx="0" cy="0"/>
+          <a:chOff x="0" y="0"/>
+          <a:chExt cx="0" cy="0"/>
+        </a:xfrm>
+      </p:grpSpPr>
       <p:sp>
         <p:nvSpPr>
           <p:cNvPr id="6" name="Title 5"/>
@@ -2924,6 +2994,7 @@
         <p:spPr/>
         <p:txBody>
           <a:bodyPr/>
+          <a:lstStyle/>
           <a:p>
             <a:endParaRPr lang="en-US"/>
           </a:p>
@@ -2942,9 +3013,11 @@
         <p:spPr/>
         <p:txBody>
           <a:bodyPr/>
+          <a:lstStyle/>
           <a:p>
             <a:fld id="{B6F15528-21DE-4FAA-801E-634DDDAF4B2B}" type="slidenum">
               <a:rPr/>
+              <a:t>12</a:t>
             </a:fld>
             <a:endParaRPr/>
           </a:p>
@@ -2963,6 +3036,7 @@
         <p:spPr/>
         <p:txBody>
           <a:bodyPr/>
+          <a:lstStyle/>
           <a:p>
             <a:endParaRPr lang="en-US"/>
           </a:p>
@@ -2972,14 +3046,14 @@
         <p:nvPicPr>
           <p:cNvPr id="5" name="Content Placeholder 4"/>
           <p:cNvPicPr>
-            <a:picLocks noChangeAspect="1"/>
+            <a:picLocks noGrp="1" noChangeAspect="1"/>
           </p:cNvPicPr>
           <p:nvPr>
             <p:ph sz="half" idx="2"/>
           </p:nvPr>
         </p:nvPicPr>
         <p:blipFill>
-          <a:blip r:embed="rId1"/>
+          <a:blip r:embed="rId2"/>
           <a:stretch>
             <a:fillRect/>
           </a:stretch>
@@ -3011,7 +3085,14 @@
         <p:cNvGrpSpPr/>
         <p:nvPr/>
       </p:nvGrpSpPr>
-      <p:grpSpPr/>
+      <p:grpSpPr>
+        <a:xfrm>
+          <a:off x="0" y="0"/>
+          <a:ext cx="0" cy="0"/>
+          <a:chOff x="0" y="0"/>
+          <a:chExt cx="0" cy="0"/>
+        </a:xfrm>
+      </p:grpSpPr>
       <p:sp>
         <p:nvSpPr>
           <p:cNvPr id="6" name="Title 5"/>
@@ -3025,6 +3106,7 @@
         <p:spPr/>
         <p:txBody>
           <a:bodyPr/>
+          <a:lstStyle/>
           <a:p>
             <a:endParaRPr lang="en-US"/>
           </a:p>
@@ -3043,9 +3125,11 @@
         <p:spPr/>
         <p:txBody>
           <a:bodyPr/>
+          <a:lstStyle/>
           <a:p>
             <a:fld id="{B6F15528-21DE-4FAA-801E-634DDDAF4B2B}" type="slidenum">
               <a:rPr/>
+              <a:t>13</a:t>
             </a:fld>
             <a:endParaRPr/>
           </a:p>
@@ -3064,6 +3148,7 @@
         <p:spPr/>
         <p:txBody>
           <a:bodyPr/>
+          <a:lstStyle/>
           <a:p>
             <a:endParaRPr lang="en-US"/>
           </a:p>
@@ -3073,14 +3158,14 @@
         <p:nvPicPr>
           <p:cNvPr id="5" name="Content Placeholder 4"/>
           <p:cNvPicPr>
-            <a:picLocks noChangeAspect="1"/>
+            <a:picLocks noGrp="1" noChangeAspect="1"/>
           </p:cNvPicPr>
           <p:nvPr>
             <p:ph sz="half" idx="2"/>
           </p:nvPr>
         </p:nvPicPr>
         <p:blipFill>
-          <a:blip r:embed="rId1"/>
+          <a:blip r:embed="rId2"/>
           <a:stretch>
             <a:fillRect/>
           </a:stretch>
@@ -3112,7 +3197,14 @@
         <p:cNvGrpSpPr/>
         <p:nvPr/>
       </p:nvGrpSpPr>
-      <p:grpSpPr/>
+      <p:grpSpPr>
+        <a:xfrm>
+          <a:off x="0" y="0"/>
+          <a:ext cx="0" cy="0"/>
+          <a:chOff x="0" y="0"/>
+          <a:chExt cx="0" cy="0"/>
+        </a:xfrm>
+      </p:grpSpPr>
       <p:sp>
         <p:nvSpPr>
           <p:cNvPr id="6" name="Title 5"/>
@@ -3126,6 +3218,7 @@
         <p:spPr/>
         <p:txBody>
           <a:bodyPr/>
+          <a:lstStyle/>
           <a:p>
             <a:endParaRPr lang="en-US"/>
           </a:p>
@@ -3144,9 +3237,11 @@
         <p:spPr/>
         <p:txBody>
           <a:bodyPr/>
+          <a:lstStyle/>
           <a:p>
             <a:fld id="{B6F15528-21DE-4FAA-801E-634DDDAF4B2B}" type="slidenum">
               <a:rPr/>
+              <a:t>14</a:t>
             </a:fld>
             <a:endParaRPr/>
           </a:p>
@@ -3165,6 +3260,7 @@
         <p:spPr/>
         <p:txBody>
           <a:bodyPr/>
+          <a:lstStyle/>
           <a:p>
             <a:endParaRPr lang="en-US"/>
           </a:p>
@@ -3174,14 +3270,14 @@
         <p:nvPicPr>
           <p:cNvPr id="5" name="Content Placeholder 4"/>
           <p:cNvPicPr>
-            <a:picLocks noChangeAspect="1"/>
+            <a:picLocks noGrp="1" noChangeAspect="1"/>
           </p:cNvPicPr>
           <p:nvPr>
             <p:ph sz="half" idx="2"/>
           </p:nvPr>
         </p:nvPicPr>
         <p:blipFill>
-          <a:blip r:embed="rId1"/>
+          <a:blip r:embed="rId2"/>
           <a:stretch>
             <a:fillRect/>
           </a:stretch>
@@ -3213,7 +3309,14 @@
         <p:cNvGrpSpPr/>
         <p:nvPr/>
       </p:nvGrpSpPr>
-      <p:grpSpPr/>
+      <p:grpSpPr>
+        <a:xfrm>
+          <a:off x="0" y="0"/>
+          <a:ext cx="0" cy="0"/>
+          <a:chOff x="0" y="0"/>
+          <a:chExt cx="0" cy="0"/>
+        </a:xfrm>
+      </p:grpSpPr>
       <p:sp>
         <p:nvSpPr>
           <p:cNvPr id="6" name="Title 5"/>
@@ -3227,6 +3330,7 @@
         <p:spPr/>
         <p:txBody>
           <a:bodyPr/>
+          <a:lstStyle/>
           <a:p>
             <a:endParaRPr lang="en-US"/>
           </a:p>
@@ -3245,9 +3349,11 @@
         <p:spPr/>
         <p:txBody>
           <a:bodyPr/>
+          <a:lstStyle/>
           <a:p>
             <a:fld id="{B6F15528-21DE-4FAA-801E-634DDDAF4B2B}" type="slidenum">
               <a:rPr/>
+              <a:t>15</a:t>
             </a:fld>
             <a:endParaRPr/>
           </a:p>
@@ -3266,6 +3372,7 @@
         <p:spPr/>
         <p:txBody>
           <a:bodyPr/>
+          <a:lstStyle/>
           <a:p>
             <a:endParaRPr lang="en-US"/>
           </a:p>
@@ -3275,14 +3382,14 @@
         <p:nvPicPr>
           <p:cNvPr id="5" name="Content Placeholder 4"/>
           <p:cNvPicPr>
-            <a:picLocks noChangeAspect="1"/>
+            <a:picLocks noGrp="1" noChangeAspect="1"/>
           </p:cNvPicPr>
           <p:nvPr>
             <p:ph sz="half" idx="2"/>
           </p:nvPr>
         </p:nvPicPr>
         <p:blipFill>
-          <a:blip r:embed="rId1"/>
+          <a:blip r:embed="rId2"/>
           <a:stretch>
             <a:fillRect/>
           </a:stretch>
@@ -3314,7 +3421,14 @@
         <p:cNvGrpSpPr/>
         <p:nvPr/>
       </p:nvGrpSpPr>
-      <p:grpSpPr/>
+      <p:grpSpPr>
+        <a:xfrm>
+          <a:off x="0" y="0"/>
+          <a:ext cx="0" cy="0"/>
+          <a:chOff x="0" y="0"/>
+          <a:chExt cx="0" cy="0"/>
+        </a:xfrm>
+      </p:grpSpPr>
       <p:sp>
         <p:nvSpPr>
           <p:cNvPr id="4" name="Slide Number Placeholder 3"/>
@@ -3328,9 +3442,11 @@
         <p:spPr/>
         <p:txBody>
           <a:bodyPr/>
+          <a:lstStyle/>
           <a:p>
             <a:fld id="{B6F15528-21DE-4FAA-801E-634DDDAF4B2B}" type="slidenum">
               <a:rPr/>
+              <a:t>16</a:t>
             </a:fld>
             <a:endParaRPr/>
           </a:p>
@@ -3340,14 +3456,14 @@
         <p:nvPicPr>
           <p:cNvPr id="9" name="Content Placeholder 8"/>
           <p:cNvPicPr>
-            <a:picLocks noChangeAspect="1"/>
+            <a:picLocks noGrp="1" noChangeAspect="1"/>
           </p:cNvPicPr>
           <p:nvPr>
             <p:ph sz="half" idx="2"/>
           </p:nvPr>
         </p:nvPicPr>
         <p:blipFill>
-          <a:blip r:embed="rId1"/>
+          <a:blip r:embed="rId2"/>
           <a:stretch>
             <a:fillRect/>
           </a:stretch>
@@ -3379,25 +3495,14 @@
         <p:cNvGrpSpPr/>
         <p:nvPr/>
       </p:nvGrpSpPr>
-      <p:grpSpPr/>
-      <p:sp>
-        <p:nvSpPr>
-          <p:cNvPr id="6" name="Title 5"/>
-          <p:cNvSpPr>
-            <a:spLocks noGrp="1"/>
-          </p:cNvSpPr>
-          <p:nvPr>
-            <p:ph type="title"/>
-          </p:nvPr>
-        </p:nvSpPr>
-        <p:spPr/>
-        <p:txBody>
-          <a:bodyPr/>
-          <a:p>
-            <a:endParaRPr lang="en-US"/>
-          </a:p>
-        </p:txBody>
-      </p:sp>
+      <p:grpSpPr>
+        <a:xfrm>
+          <a:off x="0" y="0"/>
+          <a:ext cx="0" cy="0"/>
+          <a:chOff x="0" y="0"/>
+          <a:chExt cx="0" cy="0"/>
+        </a:xfrm>
+      </p:grpSpPr>
       <p:sp>
         <p:nvSpPr>
           <p:cNvPr id="4" name="Slide Number Placeholder 3"/>
@@ -3411,29 +3516,13 @@
         <p:spPr/>
         <p:txBody>
           <a:bodyPr/>
+          <a:lstStyle/>
           <a:p>
             <a:fld id="{B6F15528-21DE-4FAA-801E-634DDDAF4B2B}" type="slidenum">
               <a:rPr/>
+              <a:t>17</a:t>
             </a:fld>
             <a:endParaRPr/>
-          </a:p>
-        </p:txBody>
-      </p:sp>
-      <p:sp>
-        <p:nvSpPr>
-          <p:cNvPr id="7" name="Content Placeholder 6"/>
-          <p:cNvSpPr>
-            <a:spLocks noGrp="1"/>
-          </p:cNvSpPr>
-          <p:nvPr>
-            <p:ph sz="half" idx="3"/>
-          </p:nvPr>
-        </p:nvSpPr>
-        <p:spPr/>
-        <p:txBody>
-          <a:bodyPr/>
-          <a:p>
-            <a:endParaRPr lang="en-US"/>
           </a:p>
         </p:txBody>
       </p:sp>
@@ -3441,14 +3530,14 @@
         <p:nvPicPr>
           <p:cNvPr id="5" name="Content Placeholder 4"/>
           <p:cNvPicPr>
-            <a:picLocks noChangeAspect="1"/>
+            <a:picLocks noGrp="1" noChangeAspect="1"/>
           </p:cNvPicPr>
           <p:nvPr>
             <p:ph sz="half" idx="2"/>
           </p:nvPr>
         </p:nvPicPr>
         <p:blipFill>
-          <a:blip r:embed="rId1"/>
+          <a:blip r:embed="rId2"/>
           <a:stretch>
             <a:fillRect/>
           </a:stretch>
@@ -3480,25 +3569,14 @@
         <p:cNvGrpSpPr/>
         <p:nvPr/>
       </p:nvGrpSpPr>
-      <p:grpSpPr/>
-      <p:sp>
-        <p:nvSpPr>
-          <p:cNvPr id="7" name="Title 6"/>
-          <p:cNvSpPr>
-            <a:spLocks noGrp="1"/>
-          </p:cNvSpPr>
-          <p:nvPr>
-            <p:ph type="title"/>
-          </p:nvPr>
-        </p:nvSpPr>
-        <p:spPr/>
-        <p:txBody>
-          <a:bodyPr/>
-          <a:p>
-            <a:endParaRPr lang="en-US"/>
-          </a:p>
-        </p:txBody>
-      </p:sp>
+      <p:grpSpPr>
+        <a:xfrm>
+          <a:off x="0" y="0"/>
+          <a:ext cx="0" cy="0"/>
+          <a:chOff x="0" y="0"/>
+          <a:chExt cx="0" cy="0"/>
+        </a:xfrm>
+      </p:grpSpPr>
       <p:sp>
         <p:nvSpPr>
           <p:cNvPr id="4" name="Slide Number Placeholder 3"/>
@@ -3512,29 +3590,13 @@
         <p:spPr/>
         <p:txBody>
           <a:bodyPr/>
+          <a:lstStyle/>
           <a:p>
             <a:fld id="{B6F15528-21DE-4FAA-801E-634DDDAF4B2B}" type="slidenum">
               <a:rPr/>
+              <a:t>18</a:t>
             </a:fld>
             <a:endParaRPr/>
-          </a:p>
-        </p:txBody>
-      </p:sp>
-      <p:sp>
-        <p:nvSpPr>
-          <p:cNvPr id="8" name="Content Placeholder 7"/>
-          <p:cNvSpPr>
-            <a:spLocks noGrp="1"/>
-          </p:cNvSpPr>
-          <p:nvPr>
-            <p:ph sz="half" idx="3"/>
-          </p:nvPr>
-        </p:nvSpPr>
-        <p:spPr/>
-        <p:txBody>
-          <a:bodyPr/>
-          <a:p>
-            <a:endParaRPr lang="en-US"/>
           </a:p>
         </p:txBody>
       </p:sp>
@@ -3542,14 +3604,14 @@
         <p:nvPicPr>
           <p:cNvPr id="6" name="Content Placeholder 5"/>
           <p:cNvPicPr>
-            <a:picLocks noChangeAspect="1"/>
+            <a:picLocks noGrp="1" noChangeAspect="1"/>
           </p:cNvPicPr>
           <p:nvPr>
             <p:ph sz="half" idx="2"/>
           </p:nvPr>
         </p:nvPicPr>
         <p:blipFill>
-          <a:blip r:embed="rId1"/>
+          <a:blip r:embed="rId2"/>
           <a:stretch>
             <a:fillRect/>
           </a:stretch>
@@ -3980,7 +4042,9 @@
         <p:txBody>
           <a:bodyPr wrap="square" lIns="0" tIns="0" rIns="0" bIns="0" rtlCol="0"/>
           <a:lstStyle/>
-          <a:p/>
+          <a:p>
+            <a:endParaRPr/>
+          </a:p>
         </p:txBody>
       </p:sp>
       <p:sp>
@@ -4085,7 +4149,9 @@
         <p:txBody>
           <a:bodyPr wrap="square" lIns="0" tIns="0" rIns="0" bIns="0" rtlCol="0"/>
           <a:lstStyle/>
-          <a:p/>
+          <a:p>
+            <a:endParaRPr/>
+          </a:p>
         </p:txBody>
       </p:sp>
       <p:sp>
@@ -4172,7 +4238,9 @@
         <p:txBody>
           <a:bodyPr wrap="square" lIns="0" tIns="0" rIns="0" bIns="0" rtlCol="0"/>
           <a:lstStyle/>
-          <a:p/>
+          <a:p>
+            <a:endParaRPr/>
+          </a:p>
         </p:txBody>
       </p:sp>
       <p:sp>
@@ -4262,7 +4330,9 @@
         <p:txBody>
           <a:bodyPr wrap="square" lIns="0" tIns="0" rIns="0" bIns="0" rtlCol="0"/>
           <a:lstStyle/>
-          <a:p/>
+          <a:p>
+            <a:endParaRPr/>
+          </a:p>
         </p:txBody>
       </p:sp>
       <p:sp>
@@ -4986,9 +5056,11 @@
         <p:spPr/>
         <p:txBody>
           <a:bodyPr/>
+          <a:lstStyle/>
           <a:p>
             <a:fld id="{B6F15528-21DE-4FAA-801E-634DDDAF4B2B}" type="slidenum">
               <a:rPr/>
+              <a:t>19</a:t>
             </a:fld>
             <a:endParaRPr/>
           </a:p>
@@ -5026,7 +5098,7 @@
           <p:nvPr/>
         </p:nvPicPr>
         <p:blipFill>
-          <a:blip r:embed="rId1" cstate="print"/>
+          <a:blip r:embed="rId2" cstate="print"/>
           <a:stretch>
             <a:fillRect/>
           </a:stretch>
@@ -5054,9 +5126,11 @@
         <p:spPr/>
         <p:txBody>
           <a:bodyPr/>
+          <a:lstStyle/>
           <a:p>
             <a:fld id="{B6F15528-21DE-4FAA-801E-634DDDAF4B2B}" type="slidenum">
               <a:rPr/>
+              <a:t>2</a:t>
             </a:fld>
             <a:endParaRPr/>
           </a:p>
@@ -5094,7 +5168,7 @@
           <p:nvPr/>
         </p:nvPicPr>
         <p:blipFill>
-          <a:blip r:embed="rId1" cstate="print"/>
+          <a:blip r:embed="rId2" cstate="print"/>
           <a:stretch>
             <a:fillRect/>
           </a:stretch>
@@ -5174,7 +5248,6 @@
               <a:rPr spc="-5" dirty="0"/>
               <a:t>Components</a:t>
             </a:r>
-            <a:endParaRPr spc="-5" dirty="0"/>
           </a:p>
         </p:txBody>
       </p:sp>
@@ -5319,7 +5392,6 @@
               <a:rPr spc="-235" dirty="0"/>
               <a:t>s</a:t>
             </a:r>
-            <a:endParaRPr spc="-235" dirty="0"/>
           </a:p>
           <a:p>
             <a:pPr marL="12700" marR="2967990">
@@ -5366,7 +5438,6 @@
               <a:rPr spc="-5" dirty="0"/>
               <a:t>Components</a:t>
             </a:r>
-            <a:endParaRPr spc="-5" dirty="0"/>
           </a:p>
           <a:p>
             <a:pPr marL="12700" marR="1772285">
@@ -5437,7 +5508,6 @@
               <a:rPr spc="-40" dirty="0"/>
               <a:t>HTTP</a:t>
             </a:r>
-            <a:endParaRPr spc="-40" dirty="0"/>
           </a:p>
           <a:p>
             <a:pPr marL="12700" marR="4137025">
@@ -5484,7 +5554,6 @@
               <a:rPr spc="-5" dirty="0"/>
               <a:t>Modules</a:t>
             </a:r>
-            <a:endParaRPr spc="-5" dirty="0"/>
           </a:p>
           <a:p>
             <a:pPr marL="12700">
@@ -5543,7 +5612,6 @@
               <a:rPr spc="-10" dirty="0"/>
               <a:t>CLI</a:t>
             </a:r>
-            <a:endParaRPr spc="-10" dirty="0"/>
           </a:p>
         </p:txBody>
       </p:sp>
@@ -5626,9 +5694,11 @@
         <p:spPr/>
         <p:txBody>
           <a:bodyPr/>
+          <a:lstStyle/>
           <a:p>
             <a:fld id="{B6F15528-21DE-4FAA-801E-634DDDAF4B2B}" type="slidenum">
               <a:rPr/>
+              <a:t>20</a:t>
             </a:fld>
             <a:endParaRPr/>
           </a:p>
@@ -5651,7 +5721,14 @@
         <p:cNvGrpSpPr/>
         <p:nvPr/>
       </p:nvGrpSpPr>
-      <p:grpSpPr/>
+      <p:grpSpPr>
+        <a:xfrm>
+          <a:off x="0" y="0"/>
+          <a:ext cx="0" cy="0"/>
+          <a:chOff x="0" y="0"/>
+          <a:chExt cx="0" cy="0"/>
+        </a:xfrm>
+      </p:grpSpPr>
       <p:sp>
         <p:nvSpPr>
           <p:cNvPr id="5" name="Title 4"/>
@@ -5670,13 +5747,13 @@
         </p:spPr>
         <p:txBody>
           <a:bodyPr wrap="square"/>
+          <a:lstStyle/>
           <a:p>
             <a:pPr algn="ctr"/>
             <a:r>
               <a:rPr lang="en-US"/>
               <a:t>Distinguishing differences between Angular vs. AngularJS</a:t>
             </a:r>
-            <a:endParaRPr lang="en-US"/>
           </a:p>
         </p:txBody>
       </p:sp>
@@ -5698,9 +5775,11 @@
         </p:spPr>
         <p:txBody>
           <a:bodyPr/>
+          <a:lstStyle/>
           <a:p>
             <a:fld id="{B6F15528-21DE-4FAA-801E-634DDDAF4B2B}" type="slidenum">
               <a:rPr/>
+              <a:t>21</a:t>
             </a:fld>
             <a:endParaRPr/>
           </a:p>
@@ -5715,7 +5794,7 @@
           <p:nvPr/>
         </p:nvPicPr>
         <p:blipFill>
-          <a:blip r:embed="rId1"/>
+          <a:blip r:embed="rId2"/>
           <a:stretch>
             <a:fillRect/>
           </a:stretch>
@@ -5747,7 +5826,14 @@
         <p:cNvGrpSpPr/>
         <p:nvPr/>
       </p:nvGrpSpPr>
-      <p:grpSpPr/>
+      <p:grpSpPr>
+        <a:xfrm>
+          <a:off x="0" y="0"/>
+          <a:ext cx="0" cy="0"/>
+          <a:chOff x="0" y="0"/>
+          <a:chExt cx="0" cy="0"/>
+        </a:xfrm>
+      </p:grpSpPr>
       <p:sp>
         <p:nvSpPr>
           <p:cNvPr id="5" name="Title 4"/>
@@ -5766,13 +5852,13 @@
         </p:spPr>
         <p:txBody>
           <a:bodyPr wrap="square"/>
+          <a:lstStyle/>
           <a:p>
             <a:pPr algn="ctr"/>
             <a:r>
               <a:rPr lang="en-US"/>
               <a:t>Dependency Injection</a:t>
             </a:r>
-            <a:endParaRPr lang="en-US"/>
           </a:p>
         </p:txBody>
       </p:sp>
@@ -5789,9 +5875,11 @@
         <p:spPr/>
         <p:txBody>
           <a:bodyPr/>
+          <a:lstStyle/>
           <a:p>
             <a:fld id="{B6F15528-21DE-4FAA-801E-634DDDAF4B2B}" type="slidenum">
               <a:rPr/>
+              <a:t>22</a:t>
             </a:fld>
             <a:endParaRPr/>
           </a:p>
@@ -5806,7 +5894,7 @@
           <p:nvPr/>
         </p:nvPicPr>
         <p:blipFill>
-          <a:blip r:embed="rId1"/>
+          <a:blip r:embed="rId2"/>
           <a:stretch>
             <a:fillRect/>
           </a:stretch>
@@ -5825,14 +5913,14 @@
         <p:nvPicPr>
           <p:cNvPr id="7" name="Content Placeholder 6"/>
           <p:cNvPicPr>
-            <a:picLocks noChangeAspect="1"/>
+            <a:picLocks noGrp="1" noChangeAspect="1"/>
           </p:cNvPicPr>
           <p:nvPr>
             <p:ph sz="half" idx="2"/>
           </p:nvPr>
         </p:nvPicPr>
         <p:blipFill>
-          <a:blip r:embed="rId2"/>
+          <a:blip r:embed="rId3"/>
           <a:stretch>
             <a:fillRect/>
           </a:stretch>
@@ -5864,7 +5952,14 @@
         <p:cNvGrpSpPr/>
         <p:nvPr/>
       </p:nvGrpSpPr>
-      <p:grpSpPr/>
+      <p:grpSpPr>
+        <a:xfrm>
+          <a:off x="0" y="0"/>
+          <a:ext cx="0" cy="0"/>
+          <a:chOff x="0" y="0"/>
+          <a:chExt cx="0" cy="0"/>
+        </a:xfrm>
+      </p:grpSpPr>
       <p:sp>
         <p:nvSpPr>
           <p:cNvPr id="6" name="Title 5"/>
@@ -5883,13 +5978,13 @@
         </p:spPr>
         <p:txBody>
           <a:bodyPr wrap="square"/>
+          <a:lstStyle/>
           <a:p>
             <a:pPr algn="ctr"/>
             <a:r>
               <a:rPr lang="en-US"/>
               <a:t>AngularJS to Angular Migrations</a:t>
             </a:r>
-            <a:endParaRPr lang="en-US"/>
           </a:p>
         </p:txBody>
       </p:sp>
@@ -5906,9 +6001,11 @@
         <p:spPr/>
         <p:txBody>
           <a:bodyPr/>
+          <a:lstStyle/>
           <a:p>
             <a:fld id="{B6F15528-21DE-4FAA-801E-634DDDAF4B2B}" type="slidenum">
               <a:rPr/>
+              <a:t>23</a:t>
             </a:fld>
             <a:endParaRPr/>
           </a:p>
@@ -5918,14 +6015,14 @@
         <p:nvPicPr>
           <p:cNvPr id="5" name="Content Placeholder 4"/>
           <p:cNvPicPr>
-            <a:picLocks noChangeAspect="1"/>
+            <a:picLocks noGrp="1" noChangeAspect="1"/>
           </p:cNvPicPr>
           <p:nvPr>
             <p:ph sz="half" idx="2"/>
           </p:nvPr>
         </p:nvPicPr>
         <p:blipFill>
-          <a:blip r:embed="rId1"/>
+          <a:blip r:embed="rId2"/>
           <a:stretch>
             <a:fillRect/>
           </a:stretch>
@@ -6096,7 +6193,7 @@
           <p:nvPr/>
         </p:nvPicPr>
         <p:blipFill>
-          <a:blip r:embed="rId1" cstate="print"/>
+          <a:blip r:embed="rId2" cstate="print"/>
           <a:stretch>
             <a:fillRect/>
           </a:stretch>
@@ -6124,9 +6221,11 @@
         <p:spPr/>
         <p:txBody>
           <a:bodyPr/>
+          <a:lstStyle/>
           <a:p>
             <a:fld id="{B6F15528-21DE-4FAA-801E-634DDDAF4B2B}" type="slidenum">
               <a:rPr/>
+              <a:t>24</a:t>
             </a:fld>
             <a:endParaRPr/>
           </a:p>
@@ -6194,7 +6293,9 @@
         <p:txBody>
           <a:bodyPr wrap="square" lIns="0" tIns="0" rIns="0" bIns="0" rtlCol="0"/>
           <a:lstStyle/>
-          <a:p/>
+          <a:p>
+            <a:endParaRPr/>
+          </a:p>
         </p:txBody>
       </p:sp>
       <p:sp>
@@ -6614,7 +6715,7 @@
           <p:nvPr/>
         </p:nvPicPr>
         <p:blipFill>
-          <a:blip r:embed="rId1" cstate="print"/>
+          <a:blip r:embed="rId2" cstate="print"/>
           <a:stretch>
             <a:fillRect/>
           </a:stretch>
@@ -6792,9 +6893,11 @@
         <p:spPr/>
         <p:txBody>
           <a:bodyPr/>
+          <a:lstStyle/>
           <a:p>
             <a:fld id="{B6F15528-21DE-4FAA-801E-634DDDAF4B2B}" type="slidenum">
               <a:rPr/>
+              <a:t>3</a:t>
             </a:fld>
             <a:endParaRPr/>
           </a:p>
@@ -7190,7 +7293,9 @@
           <p:txBody>
             <a:bodyPr wrap="square" lIns="0" tIns="0" rIns="0" bIns="0" rtlCol="0"/>
             <a:lstStyle/>
-            <a:p/>
+            <a:p>
+              <a:endParaRPr/>
+            </a:p>
           </p:txBody>
         </p:sp>
         <p:sp>
@@ -7384,7 +7489,9 @@
           <p:txBody>
             <a:bodyPr wrap="square" lIns="0" tIns="0" rIns="0" bIns="0" rtlCol="0"/>
             <a:lstStyle/>
-            <a:p/>
+            <a:p>
+              <a:endParaRPr/>
+            </a:p>
           </p:txBody>
         </p:sp>
         <p:pic>
@@ -7394,7 +7501,7 @@
             <p:nvPr/>
           </p:nvPicPr>
           <p:blipFill>
-            <a:blip r:embed="rId1" cstate="print"/>
+            <a:blip r:embed="rId2" cstate="print"/>
             <a:stretch>
               <a:fillRect/>
             </a:stretch>
@@ -7564,7 +7671,9 @@
           <p:txBody>
             <a:bodyPr wrap="square" lIns="0" tIns="0" rIns="0" bIns="0" rtlCol="0"/>
             <a:lstStyle/>
-            <a:p/>
+            <a:p>
+              <a:endParaRPr/>
+            </a:p>
           </p:txBody>
         </p:sp>
         <p:sp>
@@ -7702,7 +7811,9 @@
           <p:txBody>
             <a:bodyPr wrap="square" lIns="0" tIns="0" rIns="0" bIns="0" rtlCol="0"/>
             <a:lstStyle/>
-            <a:p/>
+            <a:p>
+              <a:endParaRPr/>
+            </a:p>
           </p:txBody>
         </p:sp>
         <p:sp>
@@ -7842,7 +7953,9 @@
           <p:txBody>
             <a:bodyPr wrap="square" lIns="0" tIns="0" rIns="0" bIns="0" rtlCol="0"/>
             <a:lstStyle/>
-            <a:p/>
+            <a:p>
+              <a:endParaRPr/>
+            </a:p>
           </p:txBody>
         </p:sp>
       </p:grpSp>
@@ -7933,7 +8046,7 @@
             <p:nvPr/>
           </p:nvPicPr>
           <p:blipFill>
-            <a:blip r:embed="rId2" cstate="print"/>
+            <a:blip r:embed="rId3" cstate="print"/>
             <a:stretch>
               <a:fillRect/>
             </a:stretch>
@@ -8103,7 +8216,9 @@
           <p:txBody>
             <a:bodyPr wrap="square" lIns="0" tIns="0" rIns="0" bIns="0" rtlCol="0"/>
             <a:lstStyle/>
-            <a:p/>
+            <a:p>
+              <a:endParaRPr/>
+            </a:p>
           </p:txBody>
         </p:sp>
         <p:sp>
@@ -8229,7 +8344,9 @@
           <p:txBody>
             <a:bodyPr wrap="square" lIns="0" tIns="0" rIns="0" bIns="0" rtlCol="0"/>
             <a:lstStyle/>
-            <a:p/>
+            <a:p>
+              <a:endParaRPr/>
+            </a:p>
           </p:txBody>
         </p:sp>
         <p:sp>
@@ -8357,7 +8474,9 @@
           <p:txBody>
             <a:bodyPr wrap="square" lIns="0" tIns="0" rIns="0" bIns="0" rtlCol="0"/>
             <a:lstStyle/>
-            <a:p/>
+            <a:p>
+              <a:endParaRPr/>
+            </a:p>
           </p:txBody>
         </p:sp>
       </p:grpSp>
@@ -8468,7 +8587,7 @@
             <p:nvPr/>
           </p:nvPicPr>
           <p:blipFill>
-            <a:blip r:embed="rId3" cstate="print"/>
+            <a:blip r:embed="rId4" cstate="print"/>
             <a:stretch>
               <a:fillRect/>
             </a:stretch>
@@ -8638,7 +8757,9 @@
           <p:txBody>
             <a:bodyPr wrap="square" lIns="0" tIns="0" rIns="0" bIns="0" rtlCol="0"/>
             <a:lstStyle/>
-            <a:p/>
+            <a:p>
+              <a:endParaRPr/>
+            </a:p>
           </p:txBody>
         </p:sp>
         <p:sp>
@@ -8764,7 +8885,9 @@
           <p:txBody>
             <a:bodyPr wrap="square" lIns="0" tIns="0" rIns="0" bIns="0" rtlCol="0"/>
             <a:lstStyle/>
-            <a:p/>
+            <a:p>
+              <a:endParaRPr/>
+            </a:p>
           </p:txBody>
         </p:sp>
         <p:sp>
@@ -8892,7 +9015,9 @@
           <p:txBody>
             <a:bodyPr wrap="square" lIns="0" tIns="0" rIns="0" bIns="0" rtlCol="0"/>
             <a:lstStyle/>
-            <a:p/>
+            <a:p>
+              <a:endParaRPr/>
+            </a:p>
           </p:txBody>
         </p:sp>
       </p:grpSp>
@@ -9003,7 +9128,7 @@
             <p:nvPr/>
           </p:nvPicPr>
           <p:blipFill>
-            <a:blip r:embed="rId4" cstate="print"/>
+            <a:blip r:embed="rId5" cstate="print"/>
             <a:stretch>
               <a:fillRect/>
             </a:stretch>
@@ -9173,7 +9298,9 @@
           <p:txBody>
             <a:bodyPr wrap="square" lIns="0" tIns="0" rIns="0" bIns="0" rtlCol="0"/>
             <a:lstStyle/>
-            <a:p/>
+            <a:p>
+              <a:endParaRPr/>
+            </a:p>
           </p:txBody>
         </p:sp>
         <p:sp>
@@ -9299,7 +9426,9 @@
           <p:txBody>
             <a:bodyPr wrap="square" lIns="0" tIns="0" rIns="0" bIns="0" rtlCol="0"/>
             <a:lstStyle/>
-            <a:p/>
+            <a:p>
+              <a:endParaRPr/>
+            </a:p>
           </p:txBody>
         </p:sp>
         <p:sp>
@@ -9427,7 +9556,9 @@
           <p:txBody>
             <a:bodyPr wrap="square" lIns="0" tIns="0" rIns="0" bIns="0" rtlCol="0"/>
             <a:lstStyle/>
-            <a:p/>
+            <a:p>
+              <a:endParaRPr/>
+            </a:p>
           </p:txBody>
         </p:sp>
       </p:grpSp>
@@ -9530,9 +9661,11 @@
         <p:spPr/>
         <p:txBody>
           <a:bodyPr/>
+          <a:lstStyle/>
           <a:p>
             <a:fld id="{B6F15528-21DE-4FAA-801E-634DDDAF4B2B}" type="slidenum">
               <a:rPr/>
+              <a:t>4</a:t>
             </a:fld>
             <a:endParaRPr/>
           </a:p>
@@ -9570,7 +9703,7 @@
           <p:nvPr/>
         </p:nvPicPr>
         <p:blipFill>
-          <a:blip r:embed="rId1" cstate="print"/>
+          <a:blip r:embed="rId2" cstate="print"/>
           <a:stretch>
             <a:fillRect/>
           </a:stretch>
@@ -10002,9 +10135,11 @@
         <p:spPr/>
         <p:txBody>
           <a:bodyPr/>
+          <a:lstStyle/>
           <a:p>
             <a:fld id="{B6F15528-21DE-4FAA-801E-634DDDAF4B2B}" type="slidenum">
               <a:rPr/>
+              <a:t>5</a:t>
             </a:fld>
             <a:endParaRPr/>
           </a:p>
@@ -10940,9 +11075,11 @@
         <p:spPr/>
         <p:txBody>
           <a:bodyPr/>
+          <a:lstStyle/>
           <a:p>
             <a:fld id="{B6F15528-21DE-4FAA-801E-634DDDAF4B2B}" type="slidenum">
               <a:rPr/>
+              <a:t>6</a:t>
             </a:fld>
             <a:endParaRPr/>
           </a:p>
@@ -11190,7 +11327,9 @@
         <p:txBody>
           <a:bodyPr wrap="square" lIns="0" tIns="0" rIns="0" bIns="0" rtlCol="0"/>
           <a:lstStyle/>
-          <a:p/>
+          <a:p>
+            <a:endParaRPr/>
+          </a:p>
         </p:txBody>
       </p:sp>
       <p:sp>
@@ -11362,7 +11501,7 @@
           <p:nvPr/>
         </p:nvPicPr>
         <p:blipFill>
-          <a:blip r:embed="rId1" cstate="print"/>
+          <a:blip r:embed="rId2" cstate="print"/>
           <a:stretch>
             <a:fillRect/>
           </a:stretch>
@@ -11435,7 +11574,7 @@
           <p:nvPr/>
         </p:nvPicPr>
         <p:blipFill>
-          <a:blip r:embed="rId2" cstate="print"/>
+          <a:blip r:embed="rId3" cstate="print"/>
           <a:stretch>
             <a:fillRect/>
           </a:stretch>
@@ -11622,9 +11761,11 @@
         <p:spPr/>
         <p:txBody>
           <a:bodyPr/>
+          <a:lstStyle/>
           <a:p>
             <a:fld id="{B6F15528-21DE-4FAA-801E-634DDDAF4B2B}" type="slidenum">
               <a:rPr/>
+              <a:t>7</a:t>
             </a:fld>
             <a:endParaRPr/>
           </a:p>
@@ -11692,7 +11833,9 @@
         <p:txBody>
           <a:bodyPr wrap="square" lIns="0" tIns="0" rIns="0" bIns="0" rtlCol="0"/>
           <a:lstStyle/>
-          <a:p/>
+          <a:p>
+            <a:endParaRPr/>
+          </a:p>
         </p:txBody>
       </p:sp>
       <p:sp>
@@ -11732,7 +11875,9 @@
         <p:txBody>
           <a:bodyPr wrap="square" lIns="0" tIns="0" rIns="0" bIns="0" rtlCol="0"/>
           <a:lstStyle/>
-          <a:p/>
+          <a:p>
+            <a:endParaRPr/>
+          </a:p>
         </p:txBody>
       </p:sp>
       <p:sp>
@@ -11772,7 +11917,9 @@
         <p:txBody>
           <a:bodyPr wrap="square" lIns="0" tIns="0" rIns="0" bIns="0" rtlCol="0"/>
           <a:lstStyle/>
-          <a:p/>
+          <a:p>
+            <a:endParaRPr/>
+          </a:p>
         </p:txBody>
       </p:sp>
       <p:sp>
@@ -12385,7 +12532,7 @@
           <p:nvPr/>
         </p:nvPicPr>
         <p:blipFill>
-          <a:blip r:embed="rId1" cstate="print"/>
+          <a:blip r:embed="rId2" cstate="print"/>
           <a:stretch>
             <a:fillRect/>
           </a:stretch>
@@ -12407,7 +12554,7 @@
           <p:nvPr/>
         </p:nvPicPr>
         <p:blipFill>
-          <a:blip r:embed="rId2" cstate="print"/>
+          <a:blip r:embed="rId3" cstate="print"/>
           <a:stretch>
             <a:fillRect/>
           </a:stretch>
@@ -12429,7 +12576,7 @@
           <p:nvPr/>
         </p:nvPicPr>
         <p:blipFill>
-          <a:blip r:embed="rId3" cstate="print"/>
+          <a:blip r:embed="rId4" cstate="print"/>
           <a:stretch>
             <a:fillRect/>
           </a:stretch>
@@ -12457,9 +12604,11 @@
         <p:spPr/>
         <p:txBody>
           <a:bodyPr/>
+          <a:lstStyle/>
           <a:p>
             <a:fld id="{B6F15528-21DE-4FAA-801E-634DDDAF4B2B}" type="slidenum">
               <a:rPr/>
+              <a:t>8</a:t>
             </a:fld>
             <a:endParaRPr/>
           </a:p>
@@ -12549,7 +12698,9 @@
           <p:txBody>
             <a:bodyPr wrap="square" lIns="0" tIns="0" rIns="0" bIns="0" rtlCol="0"/>
             <a:lstStyle/>
-            <a:p/>
+            <a:p>
+              <a:endParaRPr/>
+            </a:p>
           </p:txBody>
         </p:sp>
         <p:sp>
@@ -12597,7 +12748,9 @@
           <p:txBody>
             <a:bodyPr wrap="square" lIns="0" tIns="0" rIns="0" bIns="0" rtlCol="0"/>
             <a:lstStyle/>
-            <a:p/>
+            <a:p>
+              <a:endParaRPr/>
+            </a:p>
           </p:txBody>
         </p:sp>
         <p:sp>
@@ -12647,7 +12800,9 @@
           <p:txBody>
             <a:bodyPr wrap="square" lIns="0" tIns="0" rIns="0" bIns="0" rtlCol="0"/>
             <a:lstStyle/>
-            <a:p/>
+            <a:p>
+              <a:endParaRPr/>
+            </a:p>
           </p:txBody>
         </p:sp>
         <p:pic>
@@ -12657,7 +12812,7 @@
             <p:nvPr/>
           </p:nvPicPr>
           <p:blipFill>
-            <a:blip r:embed="rId1" cstate="print"/>
+            <a:blip r:embed="rId2" cstate="print"/>
             <a:stretch>
               <a:fillRect/>
             </a:stretch>
@@ -12712,7 +12867,7 @@
               </a:rPr>
               <a:t>Checklist</a:t>
             </a:r>
-            <a:endParaRPr sz="3600">
+            <a:endParaRPr sz="3600" dirty="0">
               <a:latin typeface="Arial" panose="020B0604020202020204"/>
               <a:cs typeface="Arial" panose="020B0604020202020204"/>
             </a:endParaRPr>
@@ -12798,7 +12953,7 @@
               </a:rPr>
               <a:t>concepts</a:t>
             </a:r>
-            <a:endParaRPr sz="3600">
+            <a:endParaRPr sz="3600" dirty="0">
               <a:latin typeface="Arial" panose="020B0604020202020204"/>
               <a:cs typeface="Arial" panose="020B0604020202020204"/>
             </a:endParaRPr>
@@ -12942,7 +13097,7 @@
               </a:rPr>
               <a:t>build</a:t>
             </a:r>
-            <a:endParaRPr sz="3600">
+            <a:endParaRPr sz="3600" dirty="0">
               <a:latin typeface="Arial" panose="020B0604020202020204"/>
               <a:cs typeface="Arial" panose="020B0604020202020204"/>
             </a:endParaRPr>
@@ -12962,9 +13117,11 @@
         <p:spPr/>
         <p:txBody>
           <a:bodyPr/>
+          <a:lstStyle/>
           <a:p>
             <a:fld id="{B6F15528-21DE-4FAA-801E-634DDDAF4B2B}" type="slidenum">
               <a:rPr/>
+              <a:t>9</a:t>
             </a:fld>
             <a:endParaRPr/>
           </a:p>
@@ -13256,6 +13413,8 @@
       </a:bgFillStyleLst>
     </a:fmtScheme>
   </a:themeElements>
+  <a:objectDefaults/>
+  <a:extraClrSchemeLst/>
   <a:extLst>
     <a:ext uri="{05A4C25C-085E-4340-85A3-A5531E510DB2}">
       <thm15:themeFamily xmlns:thm15="http://schemas.microsoft.com/office/thememl/2012/main" name="Office Theme" id="{62F939B6-93AF-4DB8-9C6B-D6C7DFDC589F}" vid="{4A3C46E8-61CC-4603-A589-7422A47A8E4A}"/>
@@ -13515,6 +13674,8 @@
       </a:bgFillStyleLst>
     </a:fmtScheme>
   </a:themeElements>
+  <a:objectDefaults/>
+  <a:extraClrSchemeLst/>
   <a:extLst>
     <a:ext uri="{05A4C25C-085E-4340-85A3-A5531E510DB2}">
       <thm15:themeFamily xmlns:thm15="http://schemas.microsoft.com/office/thememl/2012/main" name="Office Theme" id="{62F939B6-93AF-4DB8-9C6B-D6C7DFDC589F}" vid="{4A3C46E8-61CC-4603-A589-7422A47A8E4A}"/>

</xml_diff>